<commit_message>
poster and pipeline edits
</commit_message>
<xml_diff>
--- a/Poster/DSP_POSTER_TEMPLATE.pptx
+++ b/Poster/DSP_POSTER_TEMPLATE.pptx
@@ -243,7 +243,7 @@
           <a:p>
             <a:fld id="{3A675787-DA3F-4332-A401-8C5831ED470E}" type="datetimeFigureOut">
               <a:rPr lang="en-US" smtClean="0"/>
-              <a:t>3/24/2025</a:t>
+              <a:t>3/25/2025</a:t>
             </a:fld>
             <a:endParaRPr lang="en-US"/>
           </a:p>
@@ -413,7 +413,7 @@
           <a:p>
             <a:fld id="{3A675787-DA3F-4332-A401-8C5831ED470E}" type="datetimeFigureOut">
               <a:rPr lang="en-US" smtClean="0"/>
-              <a:t>3/24/2025</a:t>
+              <a:t>3/25/2025</a:t>
             </a:fld>
             <a:endParaRPr lang="en-US"/>
           </a:p>
@@ -593,7 +593,7 @@
           <a:p>
             <a:fld id="{3A675787-DA3F-4332-A401-8C5831ED470E}" type="datetimeFigureOut">
               <a:rPr lang="en-US" smtClean="0"/>
-              <a:t>3/24/2025</a:t>
+              <a:t>3/25/2025</a:t>
             </a:fld>
             <a:endParaRPr lang="en-US"/>
           </a:p>
@@ -763,7 +763,7 @@
           <a:p>
             <a:fld id="{3A675787-DA3F-4332-A401-8C5831ED470E}" type="datetimeFigureOut">
               <a:rPr lang="en-US" smtClean="0"/>
-              <a:t>3/24/2025</a:t>
+              <a:t>3/25/2025</a:t>
             </a:fld>
             <a:endParaRPr lang="en-US"/>
           </a:p>
@@ -1007,7 +1007,7 @@
           <a:p>
             <a:fld id="{3A675787-DA3F-4332-A401-8C5831ED470E}" type="datetimeFigureOut">
               <a:rPr lang="en-US" smtClean="0"/>
-              <a:t>3/24/2025</a:t>
+              <a:t>3/25/2025</a:t>
             </a:fld>
             <a:endParaRPr lang="en-US"/>
           </a:p>
@@ -1239,7 +1239,7 @@
           <a:p>
             <a:fld id="{3A675787-DA3F-4332-A401-8C5831ED470E}" type="datetimeFigureOut">
               <a:rPr lang="en-US" smtClean="0"/>
-              <a:t>3/24/2025</a:t>
+              <a:t>3/25/2025</a:t>
             </a:fld>
             <a:endParaRPr lang="en-US"/>
           </a:p>
@@ -1606,7 +1606,7 @@
           <a:p>
             <a:fld id="{3A675787-DA3F-4332-A401-8C5831ED470E}" type="datetimeFigureOut">
               <a:rPr lang="en-US" smtClean="0"/>
-              <a:t>3/24/2025</a:t>
+              <a:t>3/25/2025</a:t>
             </a:fld>
             <a:endParaRPr lang="en-US"/>
           </a:p>
@@ -1724,7 +1724,7 @@
           <a:p>
             <a:fld id="{3A675787-DA3F-4332-A401-8C5831ED470E}" type="datetimeFigureOut">
               <a:rPr lang="en-US" smtClean="0"/>
-              <a:t>3/24/2025</a:t>
+              <a:t>3/25/2025</a:t>
             </a:fld>
             <a:endParaRPr lang="en-US"/>
           </a:p>
@@ -1819,7 +1819,7 @@
           <a:p>
             <a:fld id="{3A675787-DA3F-4332-A401-8C5831ED470E}" type="datetimeFigureOut">
               <a:rPr lang="en-US" smtClean="0"/>
-              <a:t>3/24/2025</a:t>
+              <a:t>3/25/2025</a:t>
             </a:fld>
             <a:endParaRPr lang="en-US"/>
           </a:p>
@@ -2096,7 +2096,7 @@
           <a:p>
             <a:fld id="{3A675787-DA3F-4332-A401-8C5831ED470E}" type="datetimeFigureOut">
               <a:rPr lang="en-US" smtClean="0"/>
-              <a:t>3/24/2025</a:t>
+              <a:t>3/25/2025</a:t>
             </a:fld>
             <a:endParaRPr lang="en-US"/>
           </a:p>
@@ -2353,7 +2353,7 @@
           <a:p>
             <a:fld id="{3A675787-DA3F-4332-A401-8C5831ED470E}" type="datetimeFigureOut">
               <a:rPr lang="en-US" smtClean="0"/>
-              <a:t>3/24/2025</a:t>
+              <a:t>3/25/2025</a:t>
             </a:fld>
             <a:endParaRPr lang="en-US"/>
           </a:p>
@@ -2566,7 +2566,7 @@
           <a:p>
             <a:fld id="{3A675787-DA3F-4332-A401-8C5831ED470E}" type="datetimeFigureOut">
               <a:rPr lang="en-US" smtClean="0"/>
-              <a:t>3/24/2025</a:t>
+              <a:t>3/25/2025</a:t>
             </a:fld>
             <a:endParaRPr lang="en-US"/>
           </a:p>
@@ -3184,8 +3184,8 @@
         </p:nvSpPr>
         <p:spPr>
           <a:xfrm>
-            <a:off x="322618" y="5023565"/>
-            <a:ext cx="5716326" cy="707886"/>
+            <a:off x="322617" y="5023565"/>
+            <a:ext cx="13869655" cy="3785652"/>
           </a:xfrm>
           <a:prstGeom prst="rect">
             <a:avLst/>
@@ -3199,8 +3199,14 @@
           <a:lstStyle/>
           <a:p>
             <a:r>
-              <a:rPr lang="tr-TR" sz="4000" dirty="0"/>
-              <a:t>What this Project is about</a:t>
+              <a:rPr lang="en-GB" sz="4000" b="0" i="0" dirty="0">
+                <a:solidFill>
+                  <a:srgbClr val="31333F"/>
+                </a:solidFill>
+                <a:effectLst/>
+                <a:latin typeface="Source Sans Pro" panose="020B0503030403020204" pitchFamily="34" charset="0"/>
+              </a:rPr>
+              <a:t>This project dives into the world of darts using data science techniques to uncover fascinating insights. Below you will find a short explanation for the game to give you an understanding and context to view the analysis results in. There is also a subpage to explain the data pipeline of our data science project, so the efforts to get to these results can be easily tracked.</a:t>
             </a:r>
             <a:endParaRPr lang="en-US" sz="4000" dirty="0"/>
           </a:p>

</xml_diff>